<commit_message>
Add Day 1 and splitted in 2 days, ith a README indx also
</commit_message>
<xml_diff>
--- a/gpfsTrainning_satus1.pptx
+++ b/gpfsTrainning_satus1.pptx
@@ -18,8 +18,8 @@
     <p:sldId id="391" r:id="rId9"/>
     <p:sldId id="411" r:id="rId10"/>
     <p:sldId id="397" r:id="rId11"/>
-    <p:sldId id="408" r:id="rId12"/>
-    <p:sldId id="412" r:id="rId13"/>
+    <p:sldId id="412" r:id="rId12"/>
+    <p:sldId id="408" r:id="rId13"/>
     <p:sldId id="418" r:id="rId14"/>
     <p:sldId id="419" r:id="rId15"/>
     <p:sldId id="406" r:id="rId16"/>
@@ -4381,7 +4381,7 @@
           <a:p>
             <a:fld id="{1EBEDD12-BCD5-485B-BCBC-34BB01D7923C}" type="datetimeFigureOut">
               <a:rPr lang="en-US" smtClean="0"/>
-              <a:t>09/16/25</a:t>
+              <a:t>09/17/25</a:t>
             </a:fld>
             <a:endParaRPr lang="en-US" dirty="0"/>
           </a:p>
@@ -4595,7 +4595,7 @@
           <a:p>
             <a:fld id="{6EE7A52F-9D89-7442-A8E9-48D1527B5F6B}" type="datetimeFigureOut">
               <a:rPr lang="en-US" smtClean="0"/>
-              <a:t>09/16/25</a:t>
+              <a:t>09/17/25</a:t>
             </a:fld>
             <a:endParaRPr lang="en-US" dirty="0"/>
           </a:p>
@@ -5482,7 +5482,7 @@
               <a:t>verbsRDMA</a:t>
             </a:r>
             <a:r>
-              <a:rPr lang="en-US"/>
+              <a:rPr lang="en-US" dirty="0"/>
               <a:t> is a best practice when working with NSDs over high-speed networks like InfiniBand or Omni-Path."</a:t>
             </a:r>
           </a:p>
@@ -6246,7 +6246,21 @@
             </a:r>
             <a:r>
               <a:rPr lang="en-US" dirty="0"/>
-              <a:t> — losing too many quorum nodes can make the cluster unavailable even if the nodes are technically up.”</a:t>
+              <a:t> — if we lose one of the GPFS nodes, we still have the quorum because the NetApp is configured as the third one:</a:t>
+            </a:r>
+          </a:p>
+          <a:p>
+            <a:r>
+              <a:rPr lang="en-US" dirty="0"/>
+              <a:t>- </a:t>
+            </a:r>
+            <a:r>
+              <a:rPr lang="en-US" dirty="0" err="1"/>
+              <a:t>Netapp</a:t>
+            </a:r>
+            <a:r>
+              <a:rPr lang="en-US" dirty="0"/>
+              <a:t> is the tiebreaker </a:t>
             </a:r>
           </a:p>
           <a:p>
@@ -6255,11 +6269,7 @@
           <a:p>
             <a:r>
               <a:rPr lang="en-US" dirty="0"/>
-              <a:t>Let’s go </a:t>
-            </a:r>
-            <a:r>
-              <a:rPr lang="en-US"/>
-              <a:t>to the CLI !</a:t>
+              <a:t>Let’s go to the CLI !</a:t>
             </a:r>
           </a:p>
           <a:p>
@@ -6476,178 +6486,6 @@
           <a:bodyPr/>
           <a:lstStyle/>
           <a:p>
-            <a:r>
-              <a:rPr lang="en-US" dirty="0"/>
-              <a:t>In HPC, the network layer is just as critical as compute or storage — especially when we're using </a:t>
-            </a:r>
-            <a:r>
-              <a:rPr lang="en-US" b="1" dirty="0"/>
-              <a:t>high-performance interconnects</a:t>
-            </a:r>
-            <a:r>
-              <a:rPr lang="en-US" dirty="0"/>
-              <a:t> like </a:t>
-            </a:r>
-            <a:r>
-              <a:rPr lang="en-US" b="1" dirty="0" err="1"/>
-              <a:t>Infiniband</a:t>
-            </a:r>
-            <a:r>
-              <a:rPr lang="en-US" dirty="0"/>
-              <a:t> and </a:t>
-            </a:r>
-            <a:r>
-              <a:rPr lang="en-US" b="1" dirty="0"/>
-              <a:t>Omni-Path</a:t>
-            </a:r>
-          </a:p>
-          <a:p>
-            <a:endParaRPr lang="en-US" dirty="0"/>
-          </a:p>
-          <a:p>
-            <a:r>
-              <a:rPr lang="en-US" dirty="0"/>
-              <a:t>GPFS uses RDMA over these fabrics for metadata operations and file access across nodes. So, if a port goes down or a node loses connectivity on this layer, we may see symptoms like:</a:t>
-            </a:r>
-          </a:p>
-          <a:p>
-            <a:pPr marL="174708" indent="-174708">
-              <a:buFont typeface="Arial" panose="020B0604020202020204" pitchFamily="34" charset="0"/>
-              <a:buChar char="•"/>
-            </a:pPr>
-            <a:endParaRPr lang="en-US" dirty="0"/>
-          </a:p>
-          <a:p>
-            <a:pPr marL="174708" indent="-174708">
-              <a:buFont typeface="Arial" panose="020B0604020202020204" pitchFamily="34" charset="0"/>
-              <a:buChar char="•"/>
-            </a:pPr>
-            <a:r>
-              <a:rPr lang="en-US" dirty="0"/>
-              <a:t>- </a:t>
-            </a:r>
-            <a:r>
-              <a:rPr lang="en-US" dirty="0" err="1"/>
-              <a:t>Slurm</a:t>
-            </a:r>
-            <a:r>
-              <a:rPr lang="en-US" dirty="0"/>
-              <a:t> job delays</a:t>
-            </a:r>
-          </a:p>
-          <a:p>
-            <a:pPr marL="174708" indent="-174708">
-              <a:buFont typeface="Arial" panose="020B0604020202020204" pitchFamily="34" charset="0"/>
-              <a:buChar char="•"/>
-            </a:pPr>
-            <a:r>
-              <a:rPr lang="en-US" dirty="0"/>
-              <a:t>- GPFS node in unknown state</a:t>
-            </a:r>
-          </a:p>
-          <a:p>
-            <a:pPr marL="174708" indent="-174708">
-              <a:buFont typeface="Arial" panose="020B0604020202020204" pitchFamily="34" charset="0"/>
-              <a:buChar char="•"/>
-            </a:pPr>
-            <a:r>
-              <a:rPr lang="en-US" dirty="0"/>
-              <a:t>- File system timeout or performance degradation</a:t>
-            </a:r>
-          </a:p>
-          <a:p>
-            <a:pPr marL="174708" indent="-174708">
-              <a:buFontTx/>
-              <a:buChar char="-"/>
-            </a:pPr>
-            <a:endParaRPr lang="en-US" dirty="0"/>
-          </a:p>
-          <a:p>
-            <a:r>
-              <a:rPr lang="en-US" dirty="0"/>
-              <a:t>In our cluster, we have both </a:t>
-            </a:r>
-            <a:r>
-              <a:rPr lang="en-US" b="1" dirty="0"/>
-              <a:t>Mellanox IB (mlx5_0)</a:t>
-            </a:r>
-            <a:r>
-              <a:rPr lang="en-US" dirty="0"/>
-              <a:t> and </a:t>
-            </a:r>
-            <a:r>
-              <a:rPr lang="en-US" b="1" dirty="0"/>
-              <a:t>Intel OPA (hfi1_0)</a:t>
-            </a:r>
-            <a:r>
-              <a:rPr lang="en-US" dirty="0"/>
-              <a:t> interfaces.</a:t>
-            </a:r>
-          </a:p>
-          <a:p>
-            <a:r>
-              <a:rPr lang="en-US" dirty="0"/>
-              <a:t>We use </a:t>
-            </a:r>
-            <a:r>
-              <a:rPr lang="en-US" b="1" dirty="0" err="1"/>
-              <a:t>ibstat</a:t>
-            </a:r>
-            <a:r>
-              <a:rPr lang="en-US" dirty="0"/>
-              <a:t> and </a:t>
-            </a:r>
-            <a:r>
-              <a:rPr lang="en-US" b="1" dirty="0" err="1"/>
-              <a:t>ibping</a:t>
-            </a:r>
-            <a:r>
-              <a:rPr lang="en-US" dirty="0"/>
-              <a:t> to test </a:t>
-            </a:r>
-            <a:r>
-              <a:rPr lang="en-US" b="1" dirty="0" err="1"/>
-              <a:t>Infiniband</a:t>
-            </a:r>
-            <a:r>
-              <a:rPr lang="en-US" dirty="0"/>
-              <a:t>, and </a:t>
-            </a:r>
-            <a:r>
-              <a:rPr lang="en-US" b="1" dirty="0" err="1"/>
-              <a:t>opainfo</a:t>
-            </a:r>
-            <a:r>
-              <a:rPr lang="en-US" dirty="0"/>
-              <a:t> or </a:t>
-            </a:r>
-            <a:r>
-              <a:rPr lang="en-US" b="1" dirty="0" err="1"/>
-              <a:t>opaquery</a:t>
-            </a:r>
-            <a:r>
-              <a:rPr lang="en-US" dirty="0"/>
-              <a:t> for </a:t>
-            </a:r>
-            <a:r>
-              <a:rPr lang="en-US" b="1" dirty="0"/>
-              <a:t>Omni-Path</a:t>
-            </a:r>
-            <a:r>
-              <a:rPr lang="en-US" dirty="0"/>
-              <a:t>.</a:t>
-            </a:r>
-          </a:p>
-          <a:p>
-            <a:br>
-              <a:rPr lang="en-US" dirty="0"/>
-            </a:br>
-            <a:r>
-              <a:rPr lang="en-US" dirty="0"/>
-              <a:t>continue with lab and notepad++ Slide 9 – Line 234</a:t>
-            </a:r>
-          </a:p>
-          <a:p>
             <a:endParaRPr lang="en-US" dirty="0"/>
           </a:p>
           <a:p>
@@ -7485,265 +7323,6 @@
   <p:cSld>
     <p:spTree>
       <p:nvGrpSpPr>
-        <p:cNvPr id="1" name=""/>
-        <p:cNvGrpSpPr/>
-        <p:nvPr/>
-      </p:nvGrpSpPr>
-      <p:grpSpPr>
-        <a:xfrm>
-          <a:off x="0" y="0"/>
-          <a:ext cx="0" cy="0"/>
-          <a:chOff x="0" y="0"/>
-          <a:chExt cx="0" cy="0"/>
-        </a:xfrm>
-      </p:grpSpPr>
-      <p:sp>
-        <p:nvSpPr>
-          <p:cNvPr id="2" name="Slide Image Placeholder 1"/>
-          <p:cNvSpPr>
-            <a:spLocks noGrp="1" noRot="1" noChangeAspect="1"/>
-          </p:cNvSpPr>
-          <p:nvPr>
-            <p:ph type="sldImg"/>
-          </p:nvPr>
-        </p:nvSpPr>
-        <p:spPr/>
-      </p:sp>
-      <p:sp>
-        <p:nvSpPr>
-          <p:cNvPr id="3" name="Notes Placeholder 2"/>
-          <p:cNvSpPr>
-            <a:spLocks noGrp="1"/>
-          </p:cNvSpPr>
-          <p:nvPr>
-            <p:ph type="body" idx="1"/>
-          </p:nvPr>
-        </p:nvSpPr>
-        <p:spPr/>
-        <p:txBody>
-          <a:bodyPr/>
-          <a:lstStyle/>
-          <a:p>
-            <a:r>
-              <a:rPr lang="en-US" dirty="0"/>
-              <a:t>In HPC, the network layer is just as critical as compute or storage — especially when we're using </a:t>
-            </a:r>
-            <a:r>
-              <a:rPr lang="en-US" b="1" dirty="0"/>
-              <a:t>high-performance interconnects</a:t>
-            </a:r>
-            <a:r>
-              <a:rPr lang="en-US" dirty="0"/>
-              <a:t> like </a:t>
-            </a:r>
-            <a:r>
-              <a:rPr lang="en-US" b="1" dirty="0" err="1"/>
-              <a:t>Infiniband</a:t>
-            </a:r>
-            <a:r>
-              <a:rPr lang="en-US" dirty="0"/>
-              <a:t> and </a:t>
-            </a:r>
-            <a:r>
-              <a:rPr lang="en-US" b="1" dirty="0"/>
-              <a:t>Omni-Path</a:t>
-            </a:r>
-          </a:p>
-          <a:p>
-            <a:endParaRPr lang="en-US" dirty="0"/>
-          </a:p>
-          <a:p>
-            <a:r>
-              <a:rPr lang="en-US" dirty="0"/>
-              <a:t>GPFS uses RDMA over these fabrics for metadata operations and file access across nodes. So, if a port goes down or a node loses connectivity on this layer, we may see symptoms like:</a:t>
-            </a:r>
-          </a:p>
-          <a:p>
-            <a:pPr marL="174708" indent="-174708">
-              <a:buFont typeface="Arial" panose="020B0604020202020204" pitchFamily="34" charset="0"/>
-              <a:buChar char="•"/>
-            </a:pPr>
-            <a:endParaRPr lang="en-US" dirty="0"/>
-          </a:p>
-          <a:p>
-            <a:pPr marL="174708" indent="-174708">
-              <a:buFont typeface="Arial" panose="020B0604020202020204" pitchFamily="34" charset="0"/>
-              <a:buChar char="•"/>
-            </a:pPr>
-            <a:r>
-              <a:rPr lang="en-US" dirty="0"/>
-              <a:t>- </a:t>
-            </a:r>
-            <a:r>
-              <a:rPr lang="en-US" dirty="0" err="1"/>
-              <a:t>Slurm</a:t>
-            </a:r>
-            <a:r>
-              <a:rPr lang="en-US" dirty="0"/>
-              <a:t> job delays</a:t>
-            </a:r>
-          </a:p>
-          <a:p>
-            <a:pPr marL="174708" indent="-174708">
-              <a:buFont typeface="Arial" panose="020B0604020202020204" pitchFamily="34" charset="0"/>
-              <a:buChar char="•"/>
-            </a:pPr>
-            <a:r>
-              <a:rPr lang="en-US" dirty="0"/>
-              <a:t>- GPFS node in unknown state</a:t>
-            </a:r>
-          </a:p>
-          <a:p>
-            <a:pPr marL="174708" indent="-174708">
-              <a:buFont typeface="Arial" panose="020B0604020202020204" pitchFamily="34" charset="0"/>
-              <a:buChar char="•"/>
-            </a:pPr>
-            <a:r>
-              <a:rPr lang="en-US" dirty="0"/>
-              <a:t>- File system timeout or performance degradation</a:t>
-            </a:r>
-          </a:p>
-          <a:p>
-            <a:pPr marL="174708" indent="-174708">
-              <a:buFontTx/>
-              <a:buChar char="-"/>
-            </a:pPr>
-            <a:endParaRPr lang="en-US" dirty="0"/>
-          </a:p>
-          <a:p>
-            <a:r>
-              <a:rPr lang="en-US" dirty="0"/>
-              <a:t>In our cluster, we have both </a:t>
-            </a:r>
-            <a:r>
-              <a:rPr lang="en-US" b="1" dirty="0"/>
-              <a:t>Mellanox IB (mlx5_0)</a:t>
-            </a:r>
-            <a:r>
-              <a:rPr lang="en-US" dirty="0"/>
-              <a:t> and </a:t>
-            </a:r>
-            <a:r>
-              <a:rPr lang="en-US" b="1" dirty="0"/>
-              <a:t>Intel OPA (hfi1_0)</a:t>
-            </a:r>
-            <a:r>
-              <a:rPr lang="en-US" dirty="0"/>
-              <a:t> interfaces.</a:t>
-            </a:r>
-          </a:p>
-          <a:p>
-            <a:r>
-              <a:rPr lang="en-US" dirty="0"/>
-              <a:t>We use </a:t>
-            </a:r>
-            <a:r>
-              <a:rPr lang="en-US" b="1" dirty="0" err="1"/>
-              <a:t>ibstat</a:t>
-            </a:r>
-            <a:r>
-              <a:rPr lang="en-US" dirty="0"/>
-              <a:t> and </a:t>
-            </a:r>
-            <a:r>
-              <a:rPr lang="en-US" b="1" dirty="0" err="1"/>
-              <a:t>ibping</a:t>
-            </a:r>
-            <a:r>
-              <a:rPr lang="en-US" dirty="0"/>
-              <a:t> to test </a:t>
-            </a:r>
-            <a:r>
-              <a:rPr lang="en-US" b="1" dirty="0" err="1"/>
-              <a:t>Infiniband</a:t>
-            </a:r>
-            <a:r>
-              <a:rPr lang="en-US" dirty="0"/>
-              <a:t>, and </a:t>
-            </a:r>
-            <a:r>
-              <a:rPr lang="en-US" b="1" dirty="0" err="1"/>
-              <a:t>opainfo</a:t>
-            </a:r>
-            <a:r>
-              <a:rPr lang="en-US" dirty="0"/>
-              <a:t> or </a:t>
-            </a:r>
-            <a:r>
-              <a:rPr lang="en-US" b="1" dirty="0" err="1"/>
-              <a:t>opaquery</a:t>
-            </a:r>
-            <a:r>
-              <a:rPr lang="en-US" dirty="0"/>
-              <a:t> for </a:t>
-            </a:r>
-            <a:r>
-              <a:rPr lang="en-US" b="1" dirty="0"/>
-              <a:t>Omni-Path</a:t>
-            </a:r>
-            <a:r>
-              <a:rPr lang="en-US" dirty="0"/>
-              <a:t>.</a:t>
-            </a:r>
-          </a:p>
-          <a:p>
-            <a:br>
-              <a:rPr lang="en-US" dirty="0"/>
-            </a:br>
-            <a:r>
-              <a:rPr lang="en-US" dirty="0"/>
-              <a:t>continue with lab and notepad++ Slide 9 – Line 234</a:t>
-            </a:r>
-          </a:p>
-          <a:p>
-            <a:endParaRPr lang="en-US" dirty="0"/>
-          </a:p>
-          <a:p>
-            <a:endParaRPr lang="en-US" dirty="0"/>
-          </a:p>
-        </p:txBody>
-      </p:sp>
-      <p:sp>
-        <p:nvSpPr>
-          <p:cNvPr id="4" name="Slide Number Placeholder 3"/>
-          <p:cNvSpPr>
-            <a:spLocks noGrp="1"/>
-          </p:cNvSpPr>
-          <p:nvPr>
-            <p:ph type="sldNum" sz="quarter" idx="5"/>
-          </p:nvPr>
-        </p:nvSpPr>
-        <p:spPr/>
-        <p:txBody>
-          <a:bodyPr/>
-          <a:lstStyle/>
-          <a:p>
-            <a:fld id="{A89C7E07-3C67-C64C-8DA0-0404F6303970}" type="slidenum">
-              <a:rPr lang="en-US" smtClean="0"/>
-              <a:t>8</a:t>
-            </a:fld>
-            <a:endParaRPr lang="en-US" dirty="0"/>
-          </a:p>
-        </p:txBody>
-      </p:sp>
-    </p:spTree>
-    <p:extLst>
-      <p:ext uri="{BB962C8B-B14F-4D97-AF65-F5344CB8AC3E}">
-        <p14:creationId xmlns:p14="http://schemas.microsoft.com/office/powerpoint/2010/main" val="2386183720"/>
-      </p:ext>
-    </p:extLst>
-  </p:cSld>
-  <p:clrMapOvr>
-    <a:masterClrMapping/>
-  </p:clrMapOvr>
-</p:notes>
-</file>
-
-<file path=ppt/notesSlides/notesSlide9.xml><?xml version="1.0" encoding="utf-8"?>
-<p:notes xmlns:a="http://schemas.openxmlformats.org/drawingml/2006/main" xmlns:r="http://schemas.openxmlformats.org/officeDocument/2006/relationships" xmlns:p="http://schemas.openxmlformats.org/presentationml/2006/main">
-  <p:cSld>
-    <p:spTree>
-      <p:nvGrpSpPr>
         <p:cNvPr id="1" name="">
           <a:extLst>
             <a:ext uri="{FF2B5EF4-FFF2-40B4-BE49-F238E27FC236}">
@@ -7803,27 +7382,19 @@
           <a:p>
             <a:r>
               <a:rPr lang="en-US" dirty="0"/>
-              <a:t>In HPC, the network layer is just as critical as compute or storage — especially when we're using </a:t>
-            </a:r>
-            <a:r>
-              <a:rPr lang="en-US" b="1" dirty="0"/>
-              <a:t>high-performance interconnects</a:t>
-            </a:r>
-            <a:r>
-              <a:rPr lang="en-US" dirty="0"/>
-              <a:t> like </a:t>
-            </a:r>
-            <a:r>
-              <a:rPr lang="en-US" b="1" dirty="0" err="1"/>
-              <a:t>Infiniband</a:t>
-            </a:r>
-            <a:r>
-              <a:rPr lang="en-US" dirty="0"/>
-              <a:t> and </a:t>
-            </a:r>
-            <a:r>
-              <a:rPr lang="en-US" b="1" dirty="0"/>
-              <a:t>Omni-Path</a:t>
+              <a:t>We separate metadata and data into different partitions in GPFS to optimize performance and reliability.</a:t>
+            </a:r>
+          </a:p>
+          <a:p>
+            <a:r>
+              <a:rPr lang="en-US" dirty="0"/>
+              <a:t> Metadata operations are small and frequent, while data operations are typically large and sequential.</a:t>
+            </a:r>
+          </a:p>
+          <a:p>
+            <a:r>
+              <a:rPr lang="en-US" dirty="0"/>
+              <a:t> Splitting them allows each to be tuned and scaled independently.”</a:t>
             </a:r>
           </a:p>
           <a:p>
@@ -7832,176 +7403,119 @@
           <a:p>
             <a:r>
               <a:rPr lang="en-US" dirty="0"/>
-              <a:t>GPFS uses RDMA over these fabrics for metadata operations and file access across nodes. So, if a port goes down or a node loses connectivity on this layer, we may see symptoms like:</a:t>
-            </a:r>
-          </a:p>
-          <a:p>
-            <a:pPr marL="174708" indent="-174708">
-              <a:buFont typeface="Arial" panose="020B0604020202020204" pitchFamily="34" charset="0"/>
-              <a:buChar char="•"/>
-            </a:pPr>
+              <a:t>Deeper Explanation (What to Say in Training):</a:t>
+            </a:r>
+          </a:p>
+          <a:p>
             <a:endParaRPr lang="en-US" dirty="0"/>
           </a:p>
           <a:p>
-            <a:pPr marL="174708" indent="-174708">
-              <a:buFont typeface="Arial" panose="020B0604020202020204" pitchFamily="34" charset="0"/>
-              <a:buChar char="•"/>
-            </a:pPr>
-            <a:r>
-              <a:rPr lang="en-US" dirty="0"/>
-              <a:t>- </a:t>
+            <a:r>
+              <a:rPr lang="en-US" dirty="0"/>
+              <a:t>“GPFS lets us define different storage pools: one for metadata and one for user data. Each pool can be backed by different LUNs or disks.</a:t>
+            </a:r>
+          </a:p>
+          <a:p>
+            <a:r>
+              <a:rPr lang="en-US" dirty="0"/>
+              <a:t>Metadata includes things like file names, directories, permissions, </a:t>
             </a:r>
             <a:r>
               <a:rPr lang="en-US" dirty="0" err="1"/>
-              <a:t>Slurm</a:t>
-            </a:r>
-            <a:r>
-              <a:rPr lang="en-US" dirty="0"/>
-              <a:t> job delays</a:t>
-            </a:r>
-          </a:p>
-          <a:p>
-            <a:pPr marL="174708" indent="-174708">
-              <a:buFont typeface="Arial" panose="020B0604020202020204" pitchFamily="34" charset="0"/>
-              <a:buChar char="•"/>
-            </a:pPr>
-            <a:r>
-              <a:rPr lang="en-US" dirty="0"/>
-              <a:t>- GPFS node in unknown state</a:t>
-            </a:r>
-          </a:p>
-          <a:p>
-            <a:pPr marL="174708" indent="-174708">
-              <a:buFont typeface="Arial" panose="020B0604020202020204" pitchFamily="34" charset="0"/>
-              <a:buChar char="•"/>
-            </a:pPr>
-            <a:r>
-              <a:rPr lang="en-US" dirty="0"/>
-              <a:t>- File system timeout or performance degradation</a:t>
-            </a:r>
-          </a:p>
-          <a:p>
-            <a:pPr marL="174708" indent="-174708">
-              <a:buFontTx/>
-              <a:buChar char="-"/>
-            </a:pPr>
-            <a:endParaRPr lang="en-US" dirty="0"/>
-          </a:p>
-          <a:p>
-            <a:r>
-              <a:rPr lang="en-US" dirty="0"/>
-              <a:t>In our cluster, we have both </a:t>
-            </a:r>
-            <a:r>
-              <a:rPr lang="en-US" b="1" dirty="0"/>
-              <a:t>Mellanox IB (mlx5_0)</a:t>
-            </a:r>
-            <a:r>
-              <a:rPr lang="en-US" dirty="0"/>
-              <a:t> and </a:t>
-            </a:r>
-            <a:r>
-              <a:rPr lang="en-US" b="1" dirty="0"/>
-              <a:t>Intel OPA (hfi1_0)</a:t>
-            </a:r>
-            <a:r>
-              <a:rPr lang="en-US" dirty="0"/>
-              <a:t> interfaces.</a:t>
-            </a:r>
-          </a:p>
-          <a:p>
-            <a:r>
-              <a:rPr lang="en-US" dirty="0"/>
-              <a:t>We use </a:t>
-            </a:r>
-            <a:r>
-              <a:rPr lang="en-US" b="1" dirty="0" err="1"/>
-              <a:t>ibstat</a:t>
-            </a:r>
-            <a:r>
-              <a:rPr lang="en-US" dirty="0"/>
-              <a:t> and </a:t>
-            </a:r>
-            <a:r>
-              <a:rPr lang="en-US" b="1" dirty="0" err="1"/>
-              <a:t>ibping</a:t>
-            </a:r>
-            <a:r>
-              <a:rPr lang="en-US" dirty="0"/>
-              <a:t> to test </a:t>
-            </a:r>
-            <a:r>
-              <a:rPr lang="en-US" b="1" dirty="0" err="1"/>
-              <a:t>Infiniband</a:t>
-            </a:r>
-            <a:r>
-              <a:rPr lang="en-US" dirty="0"/>
-              <a:t>, and </a:t>
-            </a:r>
-            <a:r>
-              <a:rPr lang="en-US" b="1" dirty="0" err="1"/>
-              <a:t>opainfo</a:t>
-            </a:r>
-            <a:r>
-              <a:rPr lang="en-US" dirty="0"/>
-              <a:t> or </a:t>
-            </a:r>
-            <a:r>
-              <a:rPr lang="en-US" b="1" dirty="0" err="1"/>
-              <a:t>opaquery</a:t>
-            </a:r>
-            <a:r>
-              <a:rPr lang="en-US" dirty="0"/>
-              <a:t> for </a:t>
-            </a:r>
-            <a:r>
-              <a:rPr lang="en-US" b="1" dirty="0"/>
-              <a:t>Omni-Path</a:t>
-            </a:r>
-            <a:r>
-              <a:rPr lang="en-US" dirty="0"/>
-              <a:t>.</a:t>
-            </a:r>
-          </a:p>
-          <a:p>
-            <a:r>
-              <a:rPr lang="en-US" dirty="0"/>
-              <a:t>In </a:t>
-            </a:r>
-            <a:r>
-              <a:rPr lang="en-US" b="1" dirty="0"/>
-              <a:t>GPFS</a:t>
-            </a:r>
-            <a:r>
-              <a:rPr lang="en-US" dirty="0"/>
-              <a:t>, the </a:t>
+              <a:t>inode</a:t>
+            </a:r>
+            <a:r>
+              <a:rPr lang="en-US" dirty="0"/>
+              <a:t> structures — it's heavily accessed even when you're just listing files or checking access. These are small, random I/O operations.</a:t>
+            </a:r>
+          </a:p>
+          <a:p>
+            <a:r>
+              <a:rPr lang="en-US" dirty="0"/>
+              <a:t>Data is the actual file content — jobs reading or writing GBs or </a:t>
             </a:r>
             <a:r>
               <a:rPr lang="en-US" dirty="0" err="1"/>
-              <a:t>verbsPorts</a:t>
-            </a:r>
-            <a:r>
-              <a:rPr lang="en-US" dirty="0"/>
-              <a:t> setting (visible in </a:t>
-            </a:r>
-            <a:r>
-              <a:rPr lang="en-US" b="1" dirty="0" err="1"/>
-              <a:t>mmlsconfig</a:t>
-            </a:r>
-            <a:r>
-              <a:rPr lang="en-US" dirty="0"/>
-              <a:t>) tells us which interface GPFS is using for RDMA communication.</a:t>
-            </a:r>
-            <a:br>
-              <a:rPr lang="en-US" dirty="0"/>
-            </a:br>
-            <a:r>
-              <a:rPr lang="en-US" dirty="0"/>
-              <a:t>If a node is using the wrong port, or a port goes down, we’ll see network-level failure even if the system is otherwise healthy.”</a:t>
-            </a:r>
-          </a:p>
-          <a:p>
-            <a:endParaRPr lang="en-US" dirty="0"/>
+              <a:t>TBs.</a:t>
+            </a:r>
+            <a:r>
+              <a:rPr lang="en-US" dirty="0"/>
+              <a:t> These are large, sequential I/O operations.</a:t>
+            </a:r>
+          </a:p>
+          <a:p>
+            <a:r>
+              <a:rPr lang="en-US" dirty="0"/>
+              <a:t>By placing them on separate disks, we prevent I/O contention. Metadata stays fast and responsive even when the data LUNs are handling heavy job throughput.</a:t>
+            </a:r>
+          </a:p>
+          <a:p>
+            <a:r>
+              <a:rPr lang="en-US" dirty="0"/>
+              <a:t>This also improves recovery time: if a data disk fails, we don’t lose the metadata structure, and vice versa.</a:t>
+            </a:r>
+          </a:p>
+          <a:p>
+            <a:r>
+              <a:rPr lang="en-US" dirty="0"/>
+              <a:t>In NetApp or other SAN setups, we usually place metadata on faster, low-latency LUNs, and data on high-throughput or larger-capacity LUNs — depending on performance goals.”</a:t>
+            </a:r>
+          </a:p>
+          <a:p>
+            <a:r>
+              <a:rPr lang="en-US" dirty="0"/>
+              <a:t>Because this metadata are stored on SSD drive, to </a:t>
+            </a:r>
+            <a:r>
+              <a:rPr lang="en-US" dirty="0" err="1"/>
+              <a:t>maximise</a:t>
+            </a:r>
+            <a:r>
+              <a:rPr lang="en-US" dirty="0"/>
+              <a:t> performance</a:t>
+            </a:r>
+          </a:p>
+          <a:p>
+            <a:r>
+              <a:rPr lang="en-US" dirty="0"/>
+              <a:t>      +---------------------------+</a:t>
+            </a:r>
+          </a:p>
+          <a:p>
+            <a:r>
+              <a:rPr lang="en-US" dirty="0"/>
+              <a:t>      |        GPFS Filesystem    |</a:t>
+            </a:r>
+          </a:p>
+          <a:p>
+            <a:r>
+              <a:rPr lang="en-US" dirty="0"/>
+              <a:t>      +---------------------------+</a:t>
+            </a:r>
+          </a:p>
+          <a:p>
+            <a:r>
+              <a:rPr lang="en-US" dirty="0"/>
+              <a:t>           |             |</a:t>
+            </a:r>
+          </a:p>
+          <a:p>
+            <a:r>
+              <a:rPr lang="en-US" dirty="0"/>
+              <a:t>    [Metadata Pool]   [Data Pool]</a:t>
+            </a:r>
+          </a:p>
+          <a:p>
+            <a:r>
+              <a:rPr lang="en-US" dirty="0"/>
+              <a:t>     LUN01, LUN02     LUN03, LUN04</a:t>
+            </a:r>
+          </a:p>
+          <a:p>
+            <a:r>
+              <a:rPr lang="en-US" dirty="0"/>
+              <a:t>     Fast SAS/SSD     High-cap HDDs</a:t>
+            </a:r>
           </a:p>
         </p:txBody>
       </p:sp>
@@ -8028,7 +7542,7 @@
           <a:p>
             <a:fld id="{A89C7E07-3C67-C64C-8DA0-0404F6303970}" type="slidenum">
               <a:rPr lang="en-US" smtClean="0"/>
-              <a:t>9</a:t>
+              <a:t>8</a:t>
             </a:fld>
             <a:endParaRPr lang="en-US" dirty="0"/>
           </a:p>
@@ -8038,6 +7552,265 @@
     <p:extLst>
       <p:ext uri="{BB962C8B-B14F-4D97-AF65-F5344CB8AC3E}">
         <p14:creationId xmlns:p14="http://schemas.microsoft.com/office/powerpoint/2010/main" val="3539474410"/>
+      </p:ext>
+    </p:extLst>
+  </p:cSld>
+  <p:clrMapOvr>
+    <a:masterClrMapping/>
+  </p:clrMapOvr>
+</p:notes>
+</file>
+
+<file path=ppt/notesSlides/notesSlide9.xml><?xml version="1.0" encoding="utf-8"?>
+<p:notes xmlns:a="http://schemas.openxmlformats.org/drawingml/2006/main" xmlns:r="http://schemas.openxmlformats.org/officeDocument/2006/relationships" xmlns:p="http://schemas.openxmlformats.org/presentationml/2006/main">
+  <p:cSld>
+    <p:spTree>
+      <p:nvGrpSpPr>
+        <p:cNvPr id="1" name=""/>
+        <p:cNvGrpSpPr/>
+        <p:nvPr/>
+      </p:nvGrpSpPr>
+      <p:grpSpPr>
+        <a:xfrm>
+          <a:off x="0" y="0"/>
+          <a:ext cx="0" cy="0"/>
+          <a:chOff x="0" y="0"/>
+          <a:chExt cx="0" cy="0"/>
+        </a:xfrm>
+      </p:grpSpPr>
+      <p:sp>
+        <p:nvSpPr>
+          <p:cNvPr id="2" name="Slide Image Placeholder 1"/>
+          <p:cNvSpPr>
+            <a:spLocks noGrp="1" noRot="1" noChangeAspect="1"/>
+          </p:cNvSpPr>
+          <p:nvPr>
+            <p:ph type="sldImg"/>
+          </p:nvPr>
+        </p:nvSpPr>
+        <p:spPr/>
+      </p:sp>
+      <p:sp>
+        <p:nvSpPr>
+          <p:cNvPr id="3" name="Notes Placeholder 2"/>
+          <p:cNvSpPr>
+            <a:spLocks noGrp="1"/>
+          </p:cNvSpPr>
+          <p:nvPr>
+            <p:ph type="body" idx="1"/>
+          </p:nvPr>
+        </p:nvSpPr>
+        <p:spPr/>
+        <p:txBody>
+          <a:bodyPr/>
+          <a:lstStyle/>
+          <a:p>
+            <a:r>
+              <a:rPr lang="en-US" dirty="0"/>
+              <a:t>In HPC, the network layer is just as critical as compute or storage — especially when we're using </a:t>
+            </a:r>
+            <a:r>
+              <a:rPr lang="en-US" b="1" dirty="0"/>
+              <a:t>high-performance interconnects</a:t>
+            </a:r>
+            <a:r>
+              <a:rPr lang="en-US" dirty="0"/>
+              <a:t> like </a:t>
+            </a:r>
+            <a:r>
+              <a:rPr lang="en-US" b="1" dirty="0" err="1"/>
+              <a:t>Infiniband</a:t>
+            </a:r>
+            <a:r>
+              <a:rPr lang="en-US" dirty="0"/>
+              <a:t> and </a:t>
+            </a:r>
+            <a:r>
+              <a:rPr lang="en-US" b="1" dirty="0"/>
+              <a:t>Omni-Path</a:t>
+            </a:r>
+          </a:p>
+          <a:p>
+            <a:endParaRPr lang="en-US" dirty="0"/>
+          </a:p>
+          <a:p>
+            <a:r>
+              <a:rPr lang="en-US" dirty="0"/>
+              <a:t>GPFS uses RDMA over these fabrics for metadata operations and file access across nodes. So, if a port goes down or a node loses connectivity on this layer, we may see symptoms like:</a:t>
+            </a:r>
+          </a:p>
+          <a:p>
+            <a:pPr marL="174708" indent="-174708">
+              <a:buFont typeface="Arial" panose="020B0604020202020204" pitchFamily="34" charset="0"/>
+              <a:buChar char="•"/>
+            </a:pPr>
+            <a:endParaRPr lang="en-US" dirty="0"/>
+          </a:p>
+          <a:p>
+            <a:pPr marL="174708" indent="-174708">
+              <a:buFont typeface="Arial" panose="020B0604020202020204" pitchFamily="34" charset="0"/>
+              <a:buChar char="•"/>
+            </a:pPr>
+            <a:r>
+              <a:rPr lang="en-US" dirty="0"/>
+              <a:t>- </a:t>
+            </a:r>
+            <a:r>
+              <a:rPr lang="en-US" dirty="0" err="1"/>
+              <a:t>Slurm</a:t>
+            </a:r>
+            <a:r>
+              <a:rPr lang="en-US" dirty="0"/>
+              <a:t> job delays</a:t>
+            </a:r>
+          </a:p>
+          <a:p>
+            <a:pPr marL="174708" indent="-174708">
+              <a:buFont typeface="Arial" panose="020B0604020202020204" pitchFamily="34" charset="0"/>
+              <a:buChar char="•"/>
+            </a:pPr>
+            <a:r>
+              <a:rPr lang="en-US" dirty="0"/>
+              <a:t>- GPFS node in unknown state</a:t>
+            </a:r>
+          </a:p>
+          <a:p>
+            <a:pPr marL="174708" indent="-174708">
+              <a:buFont typeface="Arial" panose="020B0604020202020204" pitchFamily="34" charset="0"/>
+              <a:buChar char="•"/>
+            </a:pPr>
+            <a:r>
+              <a:rPr lang="en-US" dirty="0"/>
+              <a:t>- File system timeout or performance degradation</a:t>
+            </a:r>
+          </a:p>
+          <a:p>
+            <a:pPr marL="174708" indent="-174708">
+              <a:buFontTx/>
+              <a:buChar char="-"/>
+            </a:pPr>
+            <a:endParaRPr lang="en-US" dirty="0"/>
+          </a:p>
+          <a:p>
+            <a:r>
+              <a:rPr lang="en-US" dirty="0"/>
+              <a:t>In our cluster, we have both </a:t>
+            </a:r>
+            <a:r>
+              <a:rPr lang="en-US" b="1" dirty="0"/>
+              <a:t>Mellanox IB (mlx5_0)</a:t>
+            </a:r>
+            <a:r>
+              <a:rPr lang="en-US" dirty="0"/>
+              <a:t> and </a:t>
+            </a:r>
+            <a:r>
+              <a:rPr lang="en-US" b="1" dirty="0"/>
+              <a:t>Intel OPA (hfi1_0)</a:t>
+            </a:r>
+            <a:r>
+              <a:rPr lang="en-US" dirty="0"/>
+              <a:t> interfaces.</a:t>
+            </a:r>
+          </a:p>
+          <a:p>
+            <a:r>
+              <a:rPr lang="en-US" dirty="0"/>
+              <a:t>We use </a:t>
+            </a:r>
+            <a:r>
+              <a:rPr lang="en-US" b="1" dirty="0" err="1"/>
+              <a:t>ibstat</a:t>
+            </a:r>
+            <a:r>
+              <a:rPr lang="en-US" dirty="0"/>
+              <a:t> and </a:t>
+            </a:r>
+            <a:r>
+              <a:rPr lang="en-US" b="1" dirty="0" err="1"/>
+              <a:t>ibping</a:t>
+            </a:r>
+            <a:r>
+              <a:rPr lang="en-US" dirty="0"/>
+              <a:t> to test </a:t>
+            </a:r>
+            <a:r>
+              <a:rPr lang="en-US" b="1" dirty="0" err="1"/>
+              <a:t>Infiniband</a:t>
+            </a:r>
+            <a:r>
+              <a:rPr lang="en-US" dirty="0"/>
+              <a:t>, and </a:t>
+            </a:r>
+            <a:r>
+              <a:rPr lang="en-US" b="1" dirty="0" err="1"/>
+              <a:t>opainfo</a:t>
+            </a:r>
+            <a:r>
+              <a:rPr lang="en-US" dirty="0"/>
+              <a:t> or </a:t>
+            </a:r>
+            <a:r>
+              <a:rPr lang="en-US" b="1" dirty="0" err="1"/>
+              <a:t>opaquery</a:t>
+            </a:r>
+            <a:r>
+              <a:rPr lang="en-US" dirty="0"/>
+              <a:t> for </a:t>
+            </a:r>
+            <a:r>
+              <a:rPr lang="en-US" b="1" dirty="0"/>
+              <a:t>Omni-Path</a:t>
+            </a:r>
+            <a:r>
+              <a:rPr lang="en-US" dirty="0"/>
+              <a:t>.</a:t>
+            </a:r>
+          </a:p>
+          <a:p>
+            <a:br>
+              <a:rPr lang="en-US" dirty="0"/>
+            </a:br>
+            <a:r>
+              <a:rPr lang="en-US" dirty="0"/>
+              <a:t>continue with lab and notepad++ Slide 8 – Line 224</a:t>
+            </a:r>
+          </a:p>
+          <a:p>
+            <a:endParaRPr lang="en-US" dirty="0"/>
+          </a:p>
+          <a:p>
+            <a:endParaRPr lang="en-US" dirty="0"/>
+          </a:p>
+        </p:txBody>
+      </p:sp>
+      <p:sp>
+        <p:nvSpPr>
+          <p:cNvPr id="4" name="Slide Number Placeholder 3"/>
+          <p:cNvSpPr>
+            <a:spLocks noGrp="1"/>
+          </p:cNvSpPr>
+          <p:nvPr>
+            <p:ph type="sldNum" sz="quarter" idx="5"/>
+          </p:nvPr>
+        </p:nvSpPr>
+        <p:spPr/>
+        <p:txBody>
+          <a:bodyPr/>
+          <a:lstStyle/>
+          <a:p>
+            <a:fld id="{A89C7E07-3C67-C64C-8DA0-0404F6303970}" type="slidenum">
+              <a:rPr lang="en-US" smtClean="0"/>
+              <a:t>9</a:t>
+            </a:fld>
+            <a:endParaRPr lang="en-US" dirty="0"/>
+          </a:p>
+        </p:txBody>
+      </p:sp>
+    </p:spTree>
+    <p:extLst>
+      <p:ext uri="{BB962C8B-B14F-4D97-AF65-F5344CB8AC3E}">
+        <p14:creationId xmlns:p14="http://schemas.microsoft.com/office/powerpoint/2010/main" val="2386183720"/>
       </p:ext>
     </p:extLst>
   </p:cSld>
@@ -16657,7 +16430,7 @@
         </p:blipFill>
         <p:spPr>
           <a:xfrm>
-            <a:off x="308264" y="269130"/>
+            <a:off x="360022" y="251877"/>
             <a:ext cx="9883664" cy="6004326"/>
           </a:xfrm>
           <a:prstGeom prst="rect">
@@ -21631,267 +21404,6 @@
           </p:txBody>
         </p:sp>
       </p:grpSp>
-      <p:sp>
-        <p:nvSpPr>
-          <p:cNvPr id="4" name="Rectangle 2">
-            <a:extLst>
-              <a:ext uri="{FF2B5EF4-FFF2-40B4-BE49-F238E27FC236}">
-                <a16:creationId xmlns:a16="http://schemas.microsoft.com/office/drawing/2014/main" id="{6E2833BC-2ECC-BCDF-039E-202DEAEB7929}"/>
-              </a:ext>
-            </a:extLst>
-          </p:cNvPr>
-          <p:cNvSpPr>
-            <a:spLocks noChangeArrowheads="1"/>
-          </p:cNvSpPr>
-          <p:nvPr/>
-        </p:nvSpPr>
-        <p:spPr bwMode="auto">
-          <a:xfrm>
-            <a:off x="0" y="0"/>
-            <a:ext cx="12192000" cy="457200"/>
-          </a:xfrm>
-          <a:prstGeom prst="rect">
-            <a:avLst/>
-          </a:prstGeom>
-          <a:noFill/>
-          <a:ln>
-            <a:noFill/>
-          </a:ln>
-          <a:effectLst/>
-          <a:extLst>
-            <a:ext uri="{909E8E84-426E-40DD-AFC4-6F175D3DCCD1}">
-              <a14:hiddenFill xmlns:a14="http://schemas.microsoft.com/office/drawing/2010/main">
-                <a:solidFill>
-                  <a:schemeClr val="accent1"/>
-                </a:solidFill>
-              </a14:hiddenFill>
-            </a:ext>
-            <a:ext uri="{91240B29-F687-4F45-9708-019B960494DF}">
-              <a14:hiddenLine xmlns:a14="http://schemas.microsoft.com/office/drawing/2010/main" w="9525">
-                <a:solidFill>
-                  <a:schemeClr val="tx1"/>
-                </a:solidFill>
-                <a:miter lim="800000"/>
-                <a:headEnd/>
-                <a:tailEnd/>
-              </a14:hiddenLine>
-            </a:ext>
-            <a:ext uri="{AF507438-7753-43E0-B8FC-AC1667EBCBE1}">
-              <a14:hiddenEffects xmlns:a14="http://schemas.microsoft.com/office/drawing/2010/main">
-                <a:effectLst>
-                  <a:outerShdw dist="35921" dir="2700000" algn="ctr" rotWithShape="0">
-                    <a:schemeClr val="bg2"/>
-                  </a:outerShdw>
-                </a:effectLst>
-              </a14:hiddenEffects>
-            </a:ext>
-          </a:extLst>
-        </p:spPr>
-        <p:txBody>
-          <a:bodyPr vert="horz" wrap="none" lIns="91440" tIns="45720" rIns="91440" bIns="45720" numCol="1" anchor="ctr" anchorCtr="0" compatLnSpc="1">
-            <a:prstTxWarp prst="textNoShape">
-              <a:avLst/>
-            </a:prstTxWarp>
-            <a:spAutoFit/>
-          </a:bodyPr>
-          <a:lstStyle/>
-          <a:p>
-            <a:pPr marL="0" marR="0" lvl="0" indent="0" algn="l" defTabSz="914400" rtl="0" eaLnBrk="0" fontAlgn="base" latinLnBrk="0" hangingPunct="0">
-              <a:lnSpc>
-                <a:spcPct val="100000"/>
-              </a:lnSpc>
-              <a:spcBef>
-                <a:spcPct val="0"/>
-              </a:spcBef>
-              <a:spcAft>
-                <a:spcPct val="0"/>
-              </a:spcAft>
-              <a:buClrTx/>
-              <a:buSzTx/>
-              <a:buFontTx/>
-              <a:buNone/>
-              <a:tabLst/>
-            </a:pPr>
-            <a:r>
-              <a:rPr kumimoji="0" lang="en-US" altLang="en-US" sz="1800" b="0" i="1" u="none" strike="noStrike" cap="none" normalizeH="0" baseline="0">
-                <a:ln>
-                  <a:noFill/>
-                </a:ln>
-                <a:solidFill>
-                  <a:schemeClr val="tx1"/>
-                </a:solidFill>
-                <a:effectLst/>
-                <a:latin typeface="Arial" panose="020B0604020202020204" pitchFamily="34" charset="0"/>
-              </a:rPr>
-              <a:t>Detecting LUN failures, storage disconnections, and SAN issues</a:t>
-            </a:r>
-            <a:endParaRPr kumimoji="0" lang="en-US" altLang="en-US" sz="1800" b="0" i="0" u="none" strike="noStrike" cap="none" normalizeH="0" baseline="0">
-              <a:ln>
-                <a:noFill/>
-              </a:ln>
-              <a:solidFill>
-                <a:schemeClr val="tx1"/>
-              </a:solidFill>
-              <a:effectLst/>
-              <a:latin typeface="Arial" panose="020B0604020202020204" pitchFamily="34" charset="0"/>
-            </a:endParaRPr>
-          </a:p>
-          <a:p>
-            <a:pPr marL="0" marR="0" lvl="0" indent="0" algn="l" defTabSz="914400" rtl="0" eaLnBrk="0" fontAlgn="base" latinLnBrk="0" hangingPunct="0">
-              <a:lnSpc>
-                <a:spcPct val="100000"/>
-              </a:lnSpc>
-              <a:spcBef>
-                <a:spcPct val="0"/>
-              </a:spcBef>
-              <a:spcAft>
-                <a:spcPct val="0"/>
-              </a:spcAft>
-              <a:buClrTx/>
-              <a:buSzTx/>
-              <a:buFontTx/>
-              <a:buNone/>
-              <a:tabLst/>
-            </a:pPr>
-            <a:r>
-              <a:rPr kumimoji="0" lang="en-US" altLang="en-US" sz="1800" b="0" i="0" u="none" strike="noStrike" cap="none" normalizeH="0" baseline="0">
-                <a:ln>
-                  <a:noFill/>
-                </a:ln>
-                <a:solidFill>
-                  <a:schemeClr val="tx1"/>
-                </a:solidFill>
-                <a:effectLst/>
-                <a:latin typeface="Arial" panose="020B0604020202020204" pitchFamily="34" charset="0"/>
-              </a:rPr>
-              <a:t>📦 Focus: GPFS + NetApp E-Series (SANtricity)</a:t>
-            </a:r>
-            <a:br>
-              <a:rPr kumimoji="0" lang="en-US" altLang="en-US" sz="1800" b="0" i="0" u="none" strike="noStrike" cap="none" normalizeH="0" baseline="0">
-                <a:ln>
-                  <a:noFill/>
-                </a:ln>
-                <a:solidFill>
-                  <a:schemeClr val="tx1"/>
-                </a:solidFill>
-                <a:effectLst/>
-                <a:latin typeface="Arial" panose="020B0604020202020204" pitchFamily="34" charset="0"/>
-              </a:rPr>
-            </a:br>
-            <a:r>
-              <a:rPr kumimoji="0" lang="en-US" altLang="en-US" sz="1800" b="0" i="0" u="none" strike="noStrike" cap="none" normalizeH="0" baseline="0">
-                <a:ln>
-                  <a:noFill/>
-                </a:ln>
-                <a:solidFill>
-                  <a:schemeClr val="tx1"/>
-                </a:solidFill>
-                <a:effectLst/>
-                <a:latin typeface="Arial" panose="020B0604020202020204" pitchFamily="34" charset="0"/>
-              </a:rPr>
-              <a:t>📡 Tools: </a:t>
-            </a:r>
-            <a:r>
-              <a:rPr kumimoji="0" lang="en-US" altLang="en-US" sz="1000" b="0" i="0" u="none" strike="noStrike" cap="none" normalizeH="0" baseline="0">
-                <a:ln>
-                  <a:noFill/>
-                </a:ln>
-                <a:solidFill>
-                  <a:schemeClr val="tx1"/>
-                </a:solidFill>
-                <a:effectLst/>
-                <a:latin typeface="Arial Unicode MS"/>
-              </a:rPr>
-              <a:t>mmlsdisk</a:t>
-            </a:r>
-            <a:r>
-              <a:rPr kumimoji="0" lang="en-US" altLang="en-US" sz="800" b="0" i="0" u="none" strike="noStrike" cap="none" normalizeH="0" baseline="0">
-                <a:ln>
-                  <a:noFill/>
-                </a:ln>
-                <a:solidFill>
-                  <a:schemeClr val="tx1"/>
-                </a:solidFill>
-                <a:effectLst/>
-              </a:rPr>
-              <a:t>, </a:t>
-            </a:r>
-            <a:r>
-              <a:rPr kumimoji="0" lang="en-US" altLang="en-US" sz="1000" b="0" i="0" u="none" strike="noStrike" cap="none" normalizeH="0" baseline="0">
-                <a:ln>
-                  <a:noFill/>
-                </a:ln>
-                <a:solidFill>
-                  <a:schemeClr val="tx1"/>
-                </a:solidFill>
-                <a:effectLst/>
-                <a:latin typeface="Arial Unicode MS"/>
-              </a:rPr>
-              <a:t>mmlsfs</a:t>
-            </a:r>
-            <a:r>
-              <a:rPr kumimoji="0" lang="en-US" altLang="en-US" sz="800" b="0" i="0" u="none" strike="noStrike" cap="none" normalizeH="0" baseline="0">
-                <a:ln>
-                  <a:noFill/>
-                </a:ln>
-                <a:solidFill>
-                  <a:schemeClr val="tx1"/>
-                </a:solidFill>
-                <a:effectLst/>
-              </a:rPr>
-              <a:t>, </a:t>
-            </a:r>
-            <a:r>
-              <a:rPr kumimoji="0" lang="en-US" altLang="en-US" sz="1000" b="0" i="0" u="none" strike="noStrike" cap="none" normalizeH="0" baseline="0">
-                <a:ln>
-                  <a:noFill/>
-                </a:ln>
-                <a:solidFill>
-                  <a:schemeClr val="tx1"/>
-                </a:solidFill>
-                <a:effectLst/>
-                <a:latin typeface="Arial Unicode MS"/>
-              </a:rPr>
-              <a:t>mmlsconfig</a:t>
-            </a:r>
-            <a:r>
-              <a:rPr kumimoji="0" lang="en-US" altLang="en-US" sz="800" b="0" i="0" u="none" strike="noStrike" cap="none" normalizeH="0" baseline="0">
-                <a:ln>
-                  <a:noFill/>
-                </a:ln>
-                <a:solidFill>
-                  <a:schemeClr val="tx1"/>
-                </a:solidFill>
-                <a:effectLst/>
-              </a:rPr>
-              <a:t>, </a:t>
-            </a:r>
-            <a:r>
-              <a:rPr kumimoji="0" lang="en-US" altLang="en-US" sz="1000" b="0" i="0" u="none" strike="noStrike" cap="none" normalizeH="0" baseline="0">
-                <a:ln>
-                  <a:noFill/>
-                </a:ln>
-                <a:solidFill>
-                  <a:schemeClr val="tx1"/>
-                </a:solidFill>
-                <a:effectLst/>
-                <a:latin typeface="Arial Unicode MS"/>
-              </a:rPr>
-              <a:t>SANtricity UI</a:t>
-            </a:r>
-            <a:endParaRPr kumimoji="0" lang="en-US" altLang="en-US" sz="1800" b="0" i="0" u="none" strike="noStrike" cap="none" normalizeH="0" baseline="0">
-              <a:ln>
-                <a:noFill/>
-              </a:ln>
-              <a:solidFill>
-                <a:schemeClr val="tx1"/>
-              </a:solidFill>
-              <a:effectLst/>
-              <a:latin typeface="Arial" panose="020B0604020202020204" pitchFamily="34" charset="0"/>
-            </a:endParaRPr>
-          </a:p>
-        </p:txBody>
-      </p:sp>
       <p:graphicFrame>
         <p:nvGraphicFramePr>
           <p:cNvPr id="2" name="Content Placeholder 8">
@@ -21907,7 +21419,7 @@
           <p:nvPr>
             <p:extLst>
               <p:ext uri="{D42A27DB-BD31-4B8C-83A1-F6EECF244321}">
-                <p14:modId xmlns:p14="http://schemas.microsoft.com/office/powerpoint/2010/main" val="3809473059"/>
+                <p14:modId xmlns:p14="http://schemas.microsoft.com/office/powerpoint/2010/main" val="4460701"/>
               </p:ext>
             </p:extLst>
           </p:nvPr>
@@ -22136,13 +21648,10 @@
                         </a:rPr>
                         <a:t>gpfs</a:t>
                       </a:r>
-                      <a:r>
-                        <a:rPr lang="en-US" dirty="0">
-                          <a:latin typeface="Courier New" panose="02070309020205020404" pitchFamily="49" charset="0"/>
-                          <a:cs typeface="Courier New" panose="02070309020205020404" pitchFamily="49" charset="0"/>
-                        </a:rPr>
-                        <a:t> –Y</a:t>
-                      </a:r>
+                      <a:endParaRPr lang="en-US" dirty="0">
+                        <a:latin typeface="Courier New" panose="02070309020205020404" pitchFamily="49" charset="0"/>
+                        <a:cs typeface="Courier New" panose="02070309020205020404" pitchFamily="49" charset="0"/>
+                      </a:endParaRPr>
                     </a:p>
                   </a:txBody>
                   <a:tcPr anchor="ctr"/>
@@ -22341,9 +21850,10 @@
                     <a:lstStyle/>
                     <a:p>
                       <a:r>
-                        <a:rPr lang="en-US" dirty="0"/>
-                        <a:t>Visualize IB/OPA fabric connectivity</a:t>
+                        <a:rPr lang="pt-BR" dirty="0"/>
+                        <a:t>Check the disks attached in the Netapp SAN</a:t>
                       </a:r>
+                      <a:endParaRPr lang="en-US" dirty="0"/>
                     </a:p>
                   </a:txBody>
                   <a:tcPr/>
@@ -22535,6 +22045,155 @@
 </file>
 
 <file path=ppt/slides/slide8.xml><?xml version="1.0" encoding="utf-8"?>
+<p:sld xmlns:a="http://schemas.openxmlformats.org/drawingml/2006/main" xmlns:r="http://schemas.openxmlformats.org/officeDocument/2006/relationships" xmlns:p="http://schemas.openxmlformats.org/presentationml/2006/main">
+  <p:cSld>
+    <p:spTree>
+      <p:nvGrpSpPr>
+        <p:cNvPr id="1" name="">
+          <a:extLst>
+            <a:ext uri="{FF2B5EF4-FFF2-40B4-BE49-F238E27FC236}">
+              <a16:creationId xmlns:a16="http://schemas.microsoft.com/office/drawing/2014/main" id="{F8B35DEB-A28F-A73C-768F-43C71AA35712}"/>
+            </a:ext>
+          </a:extLst>
+        </p:cNvPr>
+        <p:cNvGrpSpPr/>
+        <p:nvPr/>
+      </p:nvGrpSpPr>
+      <p:grpSpPr>
+        <a:xfrm>
+          <a:off x="0" y="0"/>
+          <a:ext cx="0" cy="0"/>
+          <a:chOff x="0" y="0"/>
+          <a:chExt cx="0" cy="0"/>
+        </a:xfrm>
+      </p:grpSpPr>
+      <p:sp>
+        <p:nvSpPr>
+          <p:cNvPr id="2" name="Title 1">
+            <a:extLst>
+              <a:ext uri="{FF2B5EF4-FFF2-40B4-BE49-F238E27FC236}">
+                <a16:creationId xmlns:a16="http://schemas.microsoft.com/office/drawing/2014/main" id="{254B9302-A19C-C109-53EE-BC305EDC5429}"/>
+              </a:ext>
+            </a:extLst>
+          </p:cNvPr>
+          <p:cNvSpPr>
+            <a:spLocks noGrp="1"/>
+          </p:cNvSpPr>
+          <p:nvPr>
+            <p:ph type="title"/>
+          </p:nvPr>
+        </p:nvSpPr>
+        <p:spPr>
+          <a:xfrm>
+            <a:off x="575310" y="278129"/>
+            <a:ext cx="5063490" cy="2354026"/>
+          </a:xfrm>
+        </p:spPr>
+        <p:txBody>
+          <a:bodyPr anchor="b">
+            <a:normAutofit/>
+          </a:bodyPr>
+          <a:lstStyle/>
+          <a:p>
+            <a:r>
+              <a:rPr lang="en-US" dirty="0"/>
+              <a:t>Metadata / Data Pool</a:t>
+            </a:r>
+          </a:p>
+        </p:txBody>
+      </p:sp>
+      <p:pic>
+        <p:nvPicPr>
+          <p:cNvPr id="6" name="Content Placeholder 5" descr="A diagram of a computer network&#10;&#10;AI-generated content may be incorrect.">
+            <a:extLst>
+              <a:ext uri="{FF2B5EF4-FFF2-40B4-BE49-F238E27FC236}">
+                <a16:creationId xmlns:a16="http://schemas.microsoft.com/office/drawing/2014/main" id="{ACA7E8F5-9263-FA4C-BF5D-FC66550EA6E1}"/>
+              </a:ext>
+            </a:extLst>
+          </p:cNvPr>
+          <p:cNvPicPr>
+            <a:picLocks noGrp="1" noChangeAspect="1"/>
+          </p:cNvPicPr>
+          <p:nvPr>
+            <p:ph type="pic" sz="quarter" idx="15"/>
+          </p:nvPr>
+        </p:nvPicPr>
+        <p:blipFill>
+          <a:blip r:embed="rId3"/>
+          <a:srcRect l="5051" r="5736"/>
+          <a:stretch>
+            <a:fillRect/>
+          </a:stretch>
+        </p:blipFill>
+        <p:spPr>
+          <a:xfrm>
+            <a:off x="6096000" y="10"/>
+            <a:ext cx="6118225" cy="6857990"/>
+          </a:xfrm>
+          <a:noFill/>
+        </p:spPr>
+      </p:pic>
+      <p:pic>
+        <p:nvPicPr>
+          <p:cNvPr id="3" name="Picture 2" descr="Alliance Services Plus | LinkedIn">
+            <a:extLst>
+              <a:ext uri="{FF2B5EF4-FFF2-40B4-BE49-F238E27FC236}">
+                <a16:creationId xmlns:a16="http://schemas.microsoft.com/office/drawing/2014/main" id="{E2B5B046-50C2-4809-E562-09853051B2D2}"/>
+              </a:ext>
+            </a:extLst>
+          </p:cNvPr>
+          <p:cNvPicPr>
+            <a:picLocks noChangeAspect="1" noChangeArrowheads="1"/>
+          </p:cNvPicPr>
+          <p:nvPr/>
+        </p:nvPicPr>
+        <p:blipFill>
+          <a:blip r:embed="rId4">
+            <a:extLst>
+              <a:ext uri="{28A0092B-C50C-407E-A947-70E740481C1C}">
+                <a14:useLocalDpi xmlns:a14="http://schemas.microsoft.com/office/drawing/2010/main" val="0"/>
+              </a:ext>
+            </a:extLst>
+          </a:blip>
+          <a:srcRect/>
+          <a:stretch>
+            <a:fillRect/>
+          </a:stretch>
+        </p:blipFill>
+        <p:spPr bwMode="auto">
+          <a:xfrm>
+            <a:off x="575310" y="5635487"/>
+            <a:ext cx="1222513" cy="1222513"/>
+          </a:xfrm>
+          <a:prstGeom prst="rect">
+            <a:avLst/>
+          </a:prstGeom>
+          <a:noFill/>
+          <a:extLst>
+            <a:ext uri="{909E8E84-426E-40DD-AFC4-6F175D3DCCD1}">
+              <a14:hiddenFill xmlns:a14="http://schemas.microsoft.com/office/drawing/2010/main">
+                <a:solidFill>
+                  <a:srgbClr val="FFFFFF"/>
+                </a:solidFill>
+              </a14:hiddenFill>
+            </a:ext>
+          </a:extLst>
+        </p:spPr>
+      </p:pic>
+    </p:spTree>
+    <p:extLst>
+      <p:ext uri="{BB962C8B-B14F-4D97-AF65-F5344CB8AC3E}">
+        <p14:creationId xmlns:p14="http://schemas.microsoft.com/office/powerpoint/2010/main" val="2737331621"/>
+      </p:ext>
+    </p:extLst>
+  </p:cSld>
+  <p:clrMapOvr>
+    <a:masterClrMapping/>
+  </p:clrMapOvr>
+</p:sld>
+</file>
+
+<file path=ppt/slides/slide9.xml><?xml version="1.0" encoding="utf-8"?>
 <p:sld xmlns:a="http://schemas.openxmlformats.org/drawingml/2006/main" xmlns:r="http://schemas.openxmlformats.org/officeDocument/2006/relationships" xmlns:p="http://schemas.openxmlformats.org/presentationml/2006/main">
   <p:cSld>
     <p:spTree>
@@ -23003,155 +22662,6 @@
     <p:extLst>
       <p:ext uri="{BB962C8B-B14F-4D97-AF65-F5344CB8AC3E}">
         <p14:creationId xmlns:p14="http://schemas.microsoft.com/office/powerpoint/2010/main" val="888484295"/>
-      </p:ext>
-    </p:extLst>
-  </p:cSld>
-  <p:clrMapOvr>
-    <a:masterClrMapping/>
-  </p:clrMapOvr>
-</p:sld>
-</file>
-
-<file path=ppt/slides/slide9.xml><?xml version="1.0" encoding="utf-8"?>
-<p:sld xmlns:a="http://schemas.openxmlformats.org/drawingml/2006/main" xmlns:r="http://schemas.openxmlformats.org/officeDocument/2006/relationships" xmlns:p="http://schemas.openxmlformats.org/presentationml/2006/main">
-  <p:cSld>
-    <p:spTree>
-      <p:nvGrpSpPr>
-        <p:cNvPr id="1" name="">
-          <a:extLst>
-            <a:ext uri="{FF2B5EF4-FFF2-40B4-BE49-F238E27FC236}">
-              <a16:creationId xmlns:a16="http://schemas.microsoft.com/office/drawing/2014/main" id="{F8B35DEB-A28F-A73C-768F-43C71AA35712}"/>
-            </a:ext>
-          </a:extLst>
-        </p:cNvPr>
-        <p:cNvGrpSpPr/>
-        <p:nvPr/>
-      </p:nvGrpSpPr>
-      <p:grpSpPr>
-        <a:xfrm>
-          <a:off x="0" y="0"/>
-          <a:ext cx="0" cy="0"/>
-          <a:chOff x="0" y="0"/>
-          <a:chExt cx="0" cy="0"/>
-        </a:xfrm>
-      </p:grpSpPr>
-      <p:sp>
-        <p:nvSpPr>
-          <p:cNvPr id="2" name="Title 1">
-            <a:extLst>
-              <a:ext uri="{FF2B5EF4-FFF2-40B4-BE49-F238E27FC236}">
-                <a16:creationId xmlns:a16="http://schemas.microsoft.com/office/drawing/2014/main" id="{254B9302-A19C-C109-53EE-BC305EDC5429}"/>
-              </a:ext>
-            </a:extLst>
-          </p:cNvPr>
-          <p:cNvSpPr>
-            <a:spLocks noGrp="1"/>
-          </p:cNvSpPr>
-          <p:nvPr>
-            <p:ph type="title"/>
-          </p:nvPr>
-        </p:nvSpPr>
-        <p:spPr>
-          <a:xfrm>
-            <a:off x="575310" y="278129"/>
-            <a:ext cx="5063490" cy="2354026"/>
-          </a:xfrm>
-        </p:spPr>
-        <p:txBody>
-          <a:bodyPr anchor="b">
-            <a:normAutofit/>
-          </a:bodyPr>
-          <a:lstStyle/>
-          <a:p>
-            <a:r>
-              <a:rPr lang="en-US" dirty="0"/>
-              <a:t>Metadata / Data Pool</a:t>
-            </a:r>
-          </a:p>
-        </p:txBody>
-      </p:sp>
-      <p:pic>
-        <p:nvPicPr>
-          <p:cNvPr id="6" name="Content Placeholder 5" descr="A diagram of a computer network&#10;&#10;AI-generated content may be incorrect.">
-            <a:extLst>
-              <a:ext uri="{FF2B5EF4-FFF2-40B4-BE49-F238E27FC236}">
-                <a16:creationId xmlns:a16="http://schemas.microsoft.com/office/drawing/2014/main" id="{ACA7E8F5-9263-FA4C-BF5D-FC66550EA6E1}"/>
-              </a:ext>
-            </a:extLst>
-          </p:cNvPr>
-          <p:cNvPicPr>
-            <a:picLocks noGrp="1" noChangeAspect="1"/>
-          </p:cNvPicPr>
-          <p:nvPr>
-            <p:ph type="pic" sz="quarter" idx="15"/>
-          </p:nvPr>
-        </p:nvPicPr>
-        <p:blipFill>
-          <a:blip r:embed="rId3"/>
-          <a:srcRect l="5051" r="5736"/>
-          <a:stretch>
-            <a:fillRect/>
-          </a:stretch>
-        </p:blipFill>
-        <p:spPr>
-          <a:xfrm>
-            <a:off x="6096000" y="10"/>
-            <a:ext cx="6118225" cy="6857990"/>
-          </a:xfrm>
-          <a:noFill/>
-        </p:spPr>
-      </p:pic>
-      <p:pic>
-        <p:nvPicPr>
-          <p:cNvPr id="3" name="Picture 2" descr="Alliance Services Plus | LinkedIn">
-            <a:extLst>
-              <a:ext uri="{FF2B5EF4-FFF2-40B4-BE49-F238E27FC236}">
-                <a16:creationId xmlns:a16="http://schemas.microsoft.com/office/drawing/2014/main" id="{E2B5B046-50C2-4809-E562-09853051B2D2}"/>
-              </a:ext>
-            </a:extLst>
-          </p:cNvPr>
-          <p:cNvPicPr>
-            <a:picLocks noChangeAspect="1" noChangeArrowheads="1"/>
-          </p:cNvPicPr>
-          <p:nvPr/>
-        </p:nvPicPr>
-        <p:blipFill>
-          <a:blip r:embed="rId4">
-            <a:extLst>
-              <a:ext uri="{28A0092B-C50C-407E-A947-70E740481C1C}">
-                <a14:useLocalDpi xmlns:a14="http://schemas.microsoft.com/office/drawing/2010/main" val="0"/>
-              </a:ext>
-            </a:extLst>
-          </a:blip>
-          <a:srcRect/>
-          <a:stretch>
-            <a:fillRect/>
-          </a:stretch>
-        </p:blipFill>
-        <p:spPr bwMode="auto">
-          <a:xfrm>
-            <a:off x="575310" y="5635487"/>
-            <a:ext cx="1222513" cy="1222513"/>
-          </a:xfrm>
-          <a:prstGeom prst="rect">
-            <a:avLst/>
-          </a:prstGeom>
-          <a:noFill/>
-          <a:extLst>
-            <a:ext uri="{909E8E84-426E-40DD-AFC4-6F175D3DCCD1}">
-              <a14:hiddenFill xmlns:a14="http://schemas.microsoft.com/office/drawing/2010/main">
-                <a:solidFill>
-                  <a:srgbClr val="FFFFFF"/>
-                </a:solidFill>
-              </a14:hiddenFill>
-            </a:ext>
-          </a:extLst>
-        </p:spPr>
-      </p:pic>
-    </p:spTree>
-    <p:extLst>
-      <p:ext uri="{BB962C8B-B14F-4D97-AF65-F5344CB8AC3E}">
-        <p14:creationId xmlns:p14="http://schemas.microsoft.com/office/powerpoint/2010/main" val="2737331621"/>
       </p:ext>
     </p:extLst>
   </p:cSld>
@@ -23973,15 +23483,6 @@
 </file>
 
 <file path=customXml/item2.xml><?xml version="1.0" encoding="utf-8"?>
-<?mso-contentType ?>
-<FormTemplates xmlns="http://schemas.microsoft.com/sharepoint/v3/contenttype/forms">
-  <Display>DocumentLibraryForm</Display>
-  <Edit>DocumentLibraryForm</Edit>
-  <New>DocumentLibraryForm</New>
-</FormTemplates>
-</file>
-
-<file path=customXml/item3.xml><?xml version="1.0" encoding="utf-8"?>
 <ct:contentTypeSchema xmlns:ct="http://schemas.microsoft.com/office/2006/metadata/contentType" xmlns:ma="http://schemas.microsoft.com/office/2006/metadata/properties/metaAttributes" ct:_="" ma:_="" ma:contentTypeName="Document" ma:contentTypeID="0x01010079F111ED35F8CC479449609E8A0923A6" ma:contentTypeVersion="28" ma:contentTypeDescription="Create a new document." ma:contentTypeScope="" ma:versionID="60f5a4f2d2b0abadcf532d48ebf9cb71">
   <xsd:schema xmlns:xsd="http://www.w3.org/2001/XMLSchema" xmlns:xs="http://www.w3.org/2001/XMLSchema" xmlns:p="http://schemas.microsoft.com/office/2006/metadata/properties" xmlns:ns1="http://schemas.microsoft.com/sharepoint/v3" xmlns:ns2="71af3243-3dd4-4a8d-8c0d-dd76da1f02a5" xmlns:ns3="16c05727-aa75-4e4a-9b5f-8a80a1165891" xmlns:ns4="230e9df3-be65-4c73-a93b-d1236ebd677e" targetNamespace="http://schemas.microsoft.com/office/2006/metadata/properties" ma:root="true" ma:fieldsID="7dd78129e6a1811f84807ad11c651531" ns1:_="" ns2:_="" ns3:_="" ns4:_="">
     <xsd:import namespace="http://schemas.microsoft.com/sharepoint/v3"/>
@@ -24293,6 +23794,15 @@
 </ct:contentTypeSchema>
 </file>
 
+<file path=customXml/item3.xml><?xml version="1.0" encoding="utf-8"?>
+<?mso-contentType ?>
+<FormTemplates xmlns="http://schemas.microsoft.com/sharepoint/v3/contenttype/forms">
+  <Display>DocumentLibraryForm</Display>
+  <Edit>DocumentLibraryForm</Edit>
+  <New>DocumentLibraryForm</New>
+</FormTemplates>
+</file>
+
 <file path=customXml/itemProps1.xml><?xml version="1.0" encoding="utf-8"?>
 <ds:datastoreItem xmlns:ds="http://schemas.openxmlformats.org/officeDocument/2006/customXml" ds:itemID="{4F4B194E-8B30-4377-8C59-ECFB902D2A26}">
   <ds:schemaRefs>
@@ -24313,14 +23823,6 @@
 </file>
 
 <file path=customXml/itemProps2.xml><?xml version="1.0" encoding="utf-8"?>
-<ds:datastoreItem xmlns:ds="http://schemas.openxmlformats.org/officeDocument/2006/customXml" ds:itemID="{C21FFAC0-05A2-416A-B06C-C248395482CF}">
-  <ds:schemaRefs>
-    <ds:schemaRef ds:uri="http://schemas.microsoft.com/sharepoint/v3/contenttype/forms"/>
-  </ds:schemaRefs>
-</ds:datastoreItem>
-</file>
-
-<file path=customXml/itemProps3.xml><?xml version="1.0" encoding="utf-8"?>
 <ds:datastoreItem xmlns:ds="http://schemas.openxmlformats.org/officeDocument/2006/customXml" ds:itemID="{92DB9E12-8AC3-4138-BF4D-720A5525AB10}">
   <ds:schemaRefs>
     <ds:schemaRef ds:uri="http://schemas.microsoft.com/office/2006/metadata/contentType"/>
@@ -24341,6 +23843,14 @@
 </ds:datastoreItem>
 </file>
 
+<file path=customXml/itemProps3.xml><?xml version="1.0" encoding="utf-8"?>
+<ds:datastoreItem xmlns:ds="http://schemas.openxmlformats.org/officeDocument/2006/customXml" ds:itemID="{C21FFAC0-05A2-416A-B06C-C248395482CF}">
+  <ds:schemaRefs>
+    <ds:schemaRef ds:uri="http://schemas.microsoft.com/sharepoint/v3/contenttype/forms"/>
+  </ds:schemaRefs>
+</ds:datastoreItem>
+</file>
+
 <file path=docMetadata/LabelInfo.xml><?xml version="1.0" encoding="utf-8"?>
 <clbl:labelList xmlns:clbl="http://schemas.microsoft.com/office/2020/mipLabelMetadata"/>
 </file>
</xml_diff>